<commit_message>
Updats ppt sprint 26
</commit_message>
<xml_diff>
--- a/Sprint 26 - Sprint review.pptx
+++ b/Sprint 26 - Sprint review.pptx
@@ -2106,7 +2106,7 @@
               <a:buNone/>
             </a:pPr>
             <a:r>
-              <a:rPr lang="en-US" sz="1200" b="0" i="0" u="none" strike="noStrike" cap="none" smtClean="0">
+              <a:rPr lang="en-US" sz="1200" b="0" i="0" u="none" strike="noStrike" cap="none">
                 <a:solidFill>
                   <a:schemeClr val="dk1"/>
                 </a:solidFill>
@@ -2794,14 +2794,303 @@
           </a:bodyPr>
           <a:lstStyle/>
           <a:p>
-            <a:pPr marL="0" marR="0" lvl="0" indent="0" algn="l" rtl="0">
-              <a:spcBef>
-                <a:spcPts val="0"/>
-              </a:spcBef>
+            <a:pPr marL="0" marR="0" lvl="0" indent="0" algn="l" defTabSz="914400" rtl="0" eaLnBrk="1" fontAlgn="auto" latinLnBrk="0" hangingPunct="1">
+              <a:lnSpc>
+                <a:spcPct val="100000"/>
+              </a:lnSpc>
+              <a:spcBef>
+                <a:spcPts val="0"/>
+              </a:spcBef>
+              <a:spcAft>
+                <a:spcPts val="0"/>
+              </a:spcAft>
+              <a:buClrTx/>
               <a:buSzPct val="25000"/>
-              <a:buNone/>
+              <a:buFontTx/>
+              <a:buNone/>
+              <a:tabLst/>
+              <a:defRPr/>
             </a:pPr>
-            <a:endParaRPr lang="th-TH" sz="1200" b="0" i="0" u="none" strike="noStrike" cap="none" dirty="0">
+            <a:r>
+              <a:rPr lang="en-US" sz="1200" dirty="0"/>
+              <a:t>Continuation (</a:t>
+            </a:r>
+            <a:r>
+              <a:rPr lang="th-TH" sz="1200" b="0" i="0" u="none" strike="noStrike" kern="1200" cap="none" dirty="0">
+                <a:solidFill>
+                  <a:schemeClr val="dk1"/>
+                </a:solidFill>
+                <a:effectLst/>
+                <a:latin typeface="Calibri"/>
+                <a:ea typeface="Calibri"/>
+                <a:cs typeface="Calibri"/>
+                <a:sym typeface="Calibri"/>
+              </a:rPr>
+              <a:t>เคินทินิว´เอ ช’น</a:t>
+            </a:r>
+            <a:r>
+              <a:rPr lang="en-US" sz="1200" b="0" i="0" u="none" strike="noStrike" kern="1200" cap="none" dirty="0">
+                <a:solidFill>
+                  <a:schemeClr val="dk1"/>
+                </a:solidFill>
+                <a:effectLst/>
+                <a:latin typeface="Calibri"/>
+                <a:ea typeface="Calibri"/>
+                <a:cs typeface="Calibri"/>
+                <a:sym typeface="Calibri"/>
+              </a:rPr>
+              <a:t>)  </a:t>
+            </a:r>
+            <a:r>
+              <a:rPr lang="en-US" sz="1200" b="0" dirty="0">
+                <a:solidFill>
+                  <a:schemeClr val="dk1"/>
+                </a:solidFill>
+                <a:latin typeface="Calibri"/>
+                <a:ea typeface="Calibri"/>
+                <a:cs typeface="Calibri"/>
+                <a:sym typeface="Calibri"/>
+              </a:rPr>
+              <a:t>Accomplishments (</a:t>
+            </a:r>
+            <a:r>
+              <a:rPr lang="th-TH" sz="1200" b="0" dirty="0">
+                <a:solidFill>
+                  <a:schemeClr val="dk1"/>
+                </a:solidFill>
+                <a:latin typeface="Calibri"/>
+                <a:ea typeface="Calibri"/>
+                <a:cs typeface="Calibri"/>
+                <a:sym typeface="Calibri"/>
+              </a:rPr>
+              <a:t>อะ</a:t>
+            </a:r>
+            <a:r>
+              <a:rPr lang="en-US" sz="1200" b="0" dirty="0">
+                <a:solidFill>
+                  <a:schemeClr val="dk1"/>
+                </a:solidFill>
+                <a:latin typeface="Calibri"/>
+                <a:ea typeface="Calibri"/>
+                <a:cs typeface="Calibri"/>
+                <a:sym typeface="Calibri"/>
+              </a:rPr>
+              <a:t>-</a:t>
+            </a:r>
+            <a:r>
+              <a:rPr lang="th-TH" sz="1200" b="0" dirty="0">
+                <a:solidFill>
+                  <a:schemeClr val="dk1"/>
+                </a:solidFill>
+                <a:latin typeface="Calibri"/>
+                <a:ea typeface="Calibri"/>
+                <a:cs typeface="Calibri"/>
+                <a:sym typeface="Calibri"/>
+              </a:rPr>
+              <a:t>คอม</a:t>
+            </a:r>
+            <a:r>
+              <a:rPr lang="en-US" sz="1200" b="0" dirty="0">
+                <a:solidFill>
+                  <a:schemeClr val="dk1"/>
+                </a:solidFill>
+                <a:latin typeface="Calibri"/>
+                <a:ea typeface="Calibri"/>
+                <a:cs typeface="Calibri"/>
+                <a:sym typeface="Calibri"/>
+              </a:rPr>
+              <a:t>-</a:t>
+            </a:r>
+            <a:r>
+              <a:rPr lang="th-TH" sz="1200" b="0" dirty="0">
+                <a:solidFill>
+                  <a:schemeClr val="dk1"/>
+                </a:solidFill>
+                <a:latin typeface="Calibri"/>
+                <a:ea typeface="Calibri"/>
+                <a:cs typeface="Calibri"/>
+                <a:sym typeface="Calibri"/>
+              </a:rPr>
+              <a:t>พรีชเมนส</a:t>
+            </a:r>
+            <a:r>
+              <a:rPr lang="en-US" sz="1200" b="0" dirty="0">
+                <a:solidFill>
+                  <a:schemeClr val="dk1"/>
+                </a:solidFill>
+                <a:latin typeface="Calibri"/>
+                <a:ea typeface="Calibri"/>
+                <a:cs typeface="Calibri"/>
+                <a:sym typeface="Calibri"/>
+              </a:rPr>
+              <a:t>)</a:t>
+            </a:r>
+          </a:p>
+          <a:p>
+            <a:pPr marL="0" marR="0" lvl="0" indent="0" algn="l" defTabSz="914400" rtl="0" eaLnBrk="1" fontAlgn="auto" latinLnBrk="0" hangingPunct="1">
+              <a:lnSpc>
+                <a:spcPct val="100000"/>
+              </a:lnSpc>
+              <a:spcBef>
+                <a:spcPts val="0"/>
+              </a:spcBef>
+              <a:spcAft>
+                <a:spcPts val="0"/>
+              </a:spcAft>
+              <a:buClrTx/>
+              <a:buSzPct val="25000"/>
+              <a:buFontTx/>
+              <a:buNone/>
+              <a:tabLst/>
+              <a:defRPr/>
+            </a:pPr>
+            <a:r>
+              <a:rPr lang="en-US" sz="1200" b="0" dirty="0">
+                <a:solidFill>
+                  <a:schemeClr val="dk1"/>
+                </a:solidFill>
+                <a:latin typeface="Calibri"/>
+                <a:ea typeface="Calibri"/>
+                <a:cs typeface="Calibri"/>
+                <a:sym typeface="Calibri"/>
+              </a:rPr>
+              <a:t>Additional -&gt; We </a:t>
+            </a:r>
+            <a:r>
+              <a:rPr lang="en-US" sz="1200" b="1" dirty="0">
+                <a:solidFill>
+                  <a:schemeClr val="dk1"/>
+                </a:solidFill>
+                <a:latin typeface="Calibri"/>
+                <a:ea typeface="Calibri"/>
+                <a:cs typeface="Calibri"/>
+                <a:sym typeface="Calibri"/>
+              </a:rPr>
+              <a:t>added</a:t>
+            </a:r>
+            <a:r>
+              <a:rPr lang="en-US" sz="1200" b="0" dirty="0">
+                <a:solidFill>
+                  <a:schemeClr val="dk1"/>
+                </a:solidFill>
+                <a:latin typeface="Calibri"/>
+                <a:ea typeface="Calibri"/>
+                <a:cs typeface="Calibri"/>
+                <a:sym typeface="Calibri"/>
+              </a:rPr>
+              <a:t> 2 user stories and also </a:t>
+            </a:r>
+            <a:r>
+              <a:rPr lang="en-US" sz="1200" b="1" dirty="0">
+                <a:solidFill>
+                  <a:schemeClr val="dk1"/>
+                </a:solidFill>
+                <a:latin typeface="Calibri"/>
+                <a:ea typeface="Calibri"/>
+                <a:cs typeface="Calibri"/>
+                <a:sym typeface="Calibri"/>
+              </a:rPr>
+              <a:t>moved</a:t>
+            </a:r>
+            <a:r>
+              <a:rPr lang="en-US" sz="1200" b="0" dirty="0">
+                <a:solidFill>
+                  <a:schemeClr val="dk1"/>
+                </a:solidFill>
+                <a:latin typeface="Calibri"/>
+                <a:ea typeface="Calibri"/>
+                <a:cs typeface="Calibri"/>
+                <a:sym typeface="Calibri"/>
+              </a:rPr>
+              <a:t> 2 user stories to backlog and creates new 5 tasks</a:t>
+            </a:r>
+          </a:p>
+          <a:p>
+            <a:pPr marL="0" marR="0" lvl="0" indent="0" algn="l" defTabSz="914400" rtl="0" eaLnBrk="1" fontAlgn="auto" latinLnBrk="0" hangingPunct="1">
+              <a:lnSpc>
+                <a:spcPct val="100000"/>
+              </a:lnSpc>
+              <a:spcBef>
+                <a:spcPts val="0"/>
+              </a:spcBef>
+              <a:spcAft>
+                <a:spcPts val="0"/>
+              </a:spcAft>
+              <a:buClrTx/>
+              <a:buSzPct val="25000"/>
+              <a:buFontTx/>
+              <a:buNone/>
+              <a:tabLst/>
+              <a:defRPr/>
+            </a:pPr>
+            <a:r>
+              <a:rPr lang="en-US" sz="1200" b="0" i="0" u="none" strike="noStrike" cap="none" dirty="0">
+                <a:solidFill>
+                  <a:schemeClr val="dk1"/>
+                </a:solidFill>
+                <a:latin typeface="Calibri"/>
+                <a:ea typeface="Calibri"/>
+                <a:cs typeface="Calibri"/>
+                <a:sym typeface="Calibri"/>
+              </a:rPr>
+              <a:t>What was we complete ? -&gt; </a:t>
+            </a:r>
+            <a:r>
+              <a:rPr lang="en-US" sz="1200" b="0" dirty="0">
+                <a:solidFill>
+                  <a:schemeClr val="dk1"/>
+                </a:solidFill>
+                <a:latin typeface="Calibri"/>
+                <a:ea typeface="Calibri"/>
+                <a:cs typeface="Calibri"/>
+                <a:sym typeface="Calibri"/>
+              </a:rPr>
+              <a:t>We have</a:t>
+            </a:r>
+            <a:r>
+              <a:rPr lang="en-US" sz="1200" b="1" dirty="0">
+                <a:solidFill>
+                  <a:schemeClr val="dk1"/>
+                </a:solidFill>
+                <a:latin typeface="Calibri"/>
+                <a:ea typeface="Calibri"/>
+                <a:cs typeface="Calibri"/>
+                <a:sym typeface="Calibri"/>
+              </a:rPr>
+              <a:t> finished </a:t>
+            </a:r>
+            <a:r>
+              <a:rPr lang="en-US" sz="1200" b="0" dirty="0">
+                <a:solidFill>
+                  <a:schemeClr val="dk1"/>
+                </a:solidFill>
+                <a:latin typeface="Calibri"/>
+                <a:ea typeface="Calibri"/>
+                <a:cs typeface="Calibri"/>
+                <a:sym typeface="Calibri"/>
+              </a:rPr>
+              <a:t>67 points, 36 User stories and 6 Tasks, We didn't have user stories unfinished.</a:t>
+            </a:r>
+          </a:p>
+          <a:p>
+            <a:pPr marL="0" marR="0" lvl="0" indent="0" algn="l" defTabSz="914400" rtl="0" eaLnBrk="1" fontAlgn="auto" latinLnBrk="0" hangingPunct="1">
+              <a:lnSpc>
+                <a:spcPct val="100000"/>
+              </a:lnSpc>
+              <a:spcBef>
+                <a:spcPts val="0"/>
+              </a:spcBef>
+              <a:spcAft>
+                <a:spcPts val="0"/>
+              </a:spcAft>
+              <a:buClrTx/>
+              <a:buSzPct val="25000"/>
+              <a:buFontTx/>
+              <a:buNone/>
+              <a:tabLst/>
+              <a:defRPr/>
+            </a:pPr>
+            <a:endParaRPr lang="en-US" sz="1200" b="0" dirty="0">
               <a:solidFill>
                 <a:schemeClr val="dk1"/>
               </a:solidFill>
@@ -2995,7 +3284,28 @@
               <a:buNone/>
             </a:pPr>
             <a:r>
-              <a:rPr lang="en-US" sz="1600" b="0" i="0" u="none" strike="noStrike" cap="none" dirty="0" smtClean="0">
+              <a:rPr lang="en-US" sz="1600" b="0" i="0" u="none" strike="noStrike" cap="none" dirty="0">
+                <a:solidFill>
+                  <a:schemeClr val="dk1"/>
+                </a:solidFill>
+                <a:latin typeface="Calibri"/>
+                <a:ea typeface="Calibri"/>
+                <a:cs typeface="Calibri"/>
+                <a:sym typeface="Calibri"/>
+              </a:rPr>
+              <a:t>I will detail of the topics</a:t>
+            </a:r>
+          </a:p>
+          <a:p>
+            <a:pPr marL="0" marR="0" lvl="0" indent="0" algn="l" rtl="0">
+              <a:spcBef>
+                <a:spcPts val="0"/>
+              </a:spcBef>
+              <a:buSzPct val="25000"/>
+              <a:buNone/>
+            </a:pPr>
+            <a:r>
+              <a:rPr lang="en-US" sz="1600" b="0" i="0" u="none" strike="noStrike" cap="none" dirty="0">
                 <a:solidFill>
                   <a:schemeClr val="dk1"/>
                 </a:solidFill>
@@ -3007,7 +3317,7 @@
               <a:t>Product</a:t>
             </a:r>
             <a:r>
-              <a:rPr lang="en-US" sz="1600" b="0" i="0" u="none" strike="noStrike" cap="none" baseline="0" dirty="0" smtClean="0">
+              <a:rPr lang="en-US" sz="1600" b="0" i="0" u="none" strike="noStrike" cap="none" baseline="0" dirty="0">
                 <a:solidFill>
                   <a:schemeClr val="dk1"/>
                 </a:solidFill>
@@ -3029,7 +3339,7 @@
               <a:buChar char="•"/>
             </a:pPr>
             <a:r>
-              <a:rPr lang="en-US" sz="1800" b="0" i="0" u="none" strike="noStrike" cap="none" baseline="0" dirty="0" smtClean="0">
+              <a:rPr lang="en-US" sz="1800" b="0" i="0" u="none" strike="noStrike" cap="none" baseline="0" dirty="0">
                 <a:solidFill>
                   <a:schemeClr val="dk1"/>
                 </a:solidFill>
@@ -3051,7 +3361,7 @@
               <a:buChar char="•"/>
             </a:pPr>
             <a:r>
-              <a:rPr lang="en-US" sz="1800" b="0" i="0" u="none" strike="noStrike" cap="none" baseline="0" dirty="0" smtClean="0">
+              <a:rPr lang="en-US" sz="1800" b="0" i="0" u="none" strike="noStrike" cap="none" baseline="0" dirty="0">
                 <a:solidFill>
                   <a:schemeClr val="dk1"/>
                 </a:solidFill>
@@ -3073,7 +3383,7 @@
               <a:buChar char="•"/>
             </a:pPr>
             <a:r>
-              <a:rPr lang="en-US" sz="1800" b="0" i="0" u="none" strike="noStrike" cap="none" baseline="0" dirty="0" smtClean="0">
+              <a:rPr lang="en-US" sz="1800" b="0" i="0" u="none" strike="noStrike" cap="none" baseline="0" dirty="0">
                 <a:solidFill>
                   <a:schemeClr val="dk1"/>
                 </a:solidFill>
@@ -3082,7 +3392,79 @@
                 <a:cs typeface="Calibri"/>
                 <a:sym typeface="Calibri"/>
               </a:rPr>
-              <a:t>There’s a new column appearing in the product list page which is Product GUID.</a:t>
+              <a:t>There’s a new column appearing (</a:t>
+            </a:r>
+            <a:r>
+              <a:rPr lang="th-TH" sz="1800" b="1" i="0" u="none" strike="noStrike" cap="none" baseline="0" dirty="0">
+                <a:solidFill>
+                  <a:schemeClr val="dk1"/>
+                </a:solidFill>
+                <a:latin typeface="Calibri"/>
+                <a:ea typeface="Calibri"/>
+                <a:cs typeface="Calibri"/>
+                <a:sym typeface="Calibri"/>
+              </a:rPr>
+              <a:t>อะ</a:t>
+            </a:r>
+            <a:r>
+              <a:rPr lang="en-US" sz="1800" b="1" i="0" u="none" strike="noStrike" cap="none" baseline="0" dirty="0">
+                <a:solidFill>
+                  <a:schemeClr val="dk1"/>
+                </a:solidFill>
+                <a:latin typeface="Calibri"/>
+                <a:ea typeface="Calibri"/>
+                <a:cs typeface="Calibri"/>
+                <a:sym typeface="Calibri"/>
+              </a:rPr>
+              <a:t>-</a:t>
+            </a:r>
+            <a:r>
+              <a:rPr lang="th-TH" sz="1800" b="1" i="0" u="none" strike="noStrike" cap="none" baseline="0" dirty="0">
+                <a:solidFill>
+                  <a:schemeClr val="dk1"/>
+                </a:solidFill>
+                <a:latin typeface="Calibri"/>
+                <a:ea typeface="Calibri"/>
+                <a:cs typeface="Calibri"/>
+                <a:sym typeface="Calibri"/>
+              </a:rPr>
+              <a:t>พริว</a:t>
+            </a:r>
+            <a:r>
+              <a:rPr lang="en-US" sz="1800" b="1" i="0" u="none" strike="noStrike" cap="none" baseline="0" dirty="0">
+                <a:solidFill>
+                  <a:schemeClr val="dk1"/>
+                </a:solidFill>
+                <a:latin typeface="Calibri"/>
+                <a:ea typeface="Calibri"/>
+                <a:cs typeface="Calibri"/>
+                <a:sym typeface="Calibri"/>
+              </a:rPr>
+              <a:t>-</a:t>
+            </a:r>
+            <a:r>
+              <a:rPr lang="th-TH" sz="1800" b="1" i="0" u="none" strike="noStrike" cap="none" baseline="0" dirty="0">
+                <a:solidFill>
+                  <a:schemeClr val="dk1"/>
+                </a:solidFill>
+                <a:latin typeface="Calibri"/>
+                <a:ea typeface="Calibri"/>
+                <a:cs typeface="Calibri"/>
+                <a:sym typeface="Calibri"/>
+              </a:rPr>
+              <a:t>ลิง</a:t>
+            </a:r>
+            <a:r>
+              <a:rPr lang="en-US" sz="1800" b="0" i="0" u="none" strike="noStrike" cap="none" baseline="0" dirty="0">
+                <a:solidFill>
+                  <a:schemeClr val="dk1"/>
+                </a:solidFill>
+                <a:latin typeface="Calibri"/>
+                <a:ea typeface="Calibri"/>
+                <a:cs typeface="Calibri"/>
+                <a:sym typeface="Calibri"/>
+              </a:rPr>
+              <a:t>) in the product list page which is Product GUID.</a:t>
             </a:r>
           </a:p>
           <a:p>
@@ -3095,7 +3477,7 @@
               <a:buChar char="•"/>
             </a:pPr>
             <a:r>
-              <a:rPr lang="en-US" sz="1800" b="0" i="0" u="none" strike="noStrike" cap="none" baseline="0" dirty="0" smtClean="0">
+              <a:rPr lang="en-US" sz="1800" b="0" i="0" u="none" strike="noStrike" cap="none" baseline="0" dirty="0">
                 <a:solidFill>
                   <a:schemeClr val="dk1"/>
                 </a:solidFill>
@@ -3116,7 +3498,7 @@
               <a:buNone/>
             </a:pPr>
             <a:r>
-              <a:rPr lang="en-US" sz="1600" b="0" i="0" u="none" strike="noStrike" cap="none" dirty="0" smtClean="0">
+              <a:rPr lang="en-US" sz="1600" b="0" i="0" u="none" strike="noStrike" cap="none" dirty="0">
                 <a:solidFill>
                   <a:schemeClr val="dk1"/>
                 </a:solidFill>
@@ -3128,7 +3510,7 @@
               <a:t>Product</a:t>
             </a:r>
             <a:r>
-              <a:rPr lang="en-US" sz="1600" b="0" i="0" u="none" strike="noStrike" cap="none" baseline="0" dirty="0" smtClean="0">
+              <a:rPr lang="en-US" sz="1600" b="0" i="0" u="none" strike="noStrike" cap="none" baseline="0" dirty="0">
                 <a:solidFill>
                   <a:schemeClr val="dk1"/>
                 </a:solidFill>
@@ -3150,7 +3532,7 @@
               <a:buChar char="•"/>
             </a:pPr>
             <a:r>
-              <a:rPr lang="en-US" sz="1800" b="0" i="0" u="none" strike="noStrike" cap="none" dirty="0" smtClean="0">
+              <a:rPr lang="en-US" sz="1800" b="0" i="0" u="none" strike="noStrike" cap="none" dirty="0">
                 <a:solidFill>
                   <a:schemeClr val="dk1"/>
                 </a:solidFill>
@@ -3162,7 +3544,7 @@
               <a:t>We</a:t>
             </a:r>
             <a:r>
-              <a:rPr lang="en-US" sz="1800" b="0" i="0" u="none" strike="noStrike" cap="none" baseline="0" dirty="0" smtClean="0">
+              <a:rPr lang="en-US" sz="1800" b="0" i="0" u="none" strike="noStrike" cap="none" baseline="0" dirty="0">
                 <a:solidFill>
                   <a:schemeClr val="dk1"/>
                 </a:solidFill>
@@ -3171,7 +3553,55 @@
                 <a:cs typeface="Calibri"/>
                 <a:sym typeface="Calibri"/>
               </a:rPr>
-              <a:t> have now the 3 tabs Validation, KYC and AML working and showing sequences of the product. These tabs let’s the user edit the flow if he wishes to do so. The user has to save before leaving or he will be alerted that he’s leaving the page without saving.</a:t>
+              <a:t> have now the 3 tabs Validation, KYC and AML working and showing sequences of the product. These tabs let’s the user edit the flow if he wishes (</a:t>
+            </a:r>
+            <a:r>
+              <a:rPr lang="th-TH" sz="1800" b="1" i="0" u="none" strike="noStrike" cap="none" baseline="0" dirty="0">
+                <a:solidFill>
+                  <a:schemeClr val="dk1"/>
+                </a:solidFill>
+                <a:latin typeface="Calibri"/>
+                <a:ea typeface="Calibri"/>
+                <a:cs typeface="Calibri"/>
+                <a:sym typeface="Calibri"/>
+              </a:rPr>
+              <a:t>วิ</a:t>
+            </a:r>
+            <a:r>
+              <a:rPr lang="en-US" sz="1800" b="1" i="0" u="none" strike="noStrike" cap="none" baseline="0" dirty="0">
+                <a:solidFill>
+                  <a:schemeClr val="dk1"/>
+                </a:solidFill>
+                <a:latin typeface="Calibri"/>
+                <a:ea typeface="Calibri"/>
+                <a:cs typeface="Calibri"/>
+                <a:sym typeface="Calibri"/>
+              </a:rPr>
+              <a:t>-</a:t>
+            </a:r>
+            <a:r>
+              <a:rPr lang="th-TH" sz="1800" b="1" i="0" u="none" strike="noStrike" cap="none" baseline="0" dirty="0">
+                <a:solidFill>
+                  <a:schemeClr val="dk1"/>
+                </a:solidFill>
+                <a:latin typeface="Calibri"/>
+                <a:ea typeface="Calibri"/>
+                <a:cs typeface="Calibri"/>
+                <a:sym typeface="Calibri"/>
+              </a:rPr>
+              <a:t>ชิส</a:t>
+            </a:r>
+            <a:r>
+              <a:rPr lang="en-US" sz="1800" b="0" i="0" u="none" strike="noStrike" cap="none" baseline="0" dirty="0">
+                <a:solidFill>
+                  <a:schemeClr val="dk1"/>
+                </a:solidFill>
+                <a:latin typeface="Calibri"/>
+                <a:ea typeface="Calibri"/>
+                <a:cs typeface="Calibri"/>
+                <a:sym typeface="Calibri"/>
+              </a:rPr>
+              <a:t>) to do so. The user has to save before leaving or he will be alerted that he’s leaving the page without saving.</a:t>
             </a:r>
           </a:p>
           <a:p>
@@ -3184,7 +3614,7 @@
               <a:buChar char="•"/>
             </a:pPr>
             <a:r>
-              <a:rPr lang="en-US" sz="1800" b="0" i="0" u="none" strike="noStrike" cap="none" baseline="0" dirty="0" smtClean="0">
+              <a:rPr lang="en-US" sz="1800" b="0" i="0" u="none" strike="noStrike" cap="none" baseline="0" dirty="0">
                 <a:solidFill>
                   <a:schemeClr val="dk1"/>
                 </a:solidFill>
@@ -3193,7 +3623,7 @@
                 <a:cs typeface="Calibri"/>
                 <a:sym typeface="Calibri"/>
               </a:rPr>
-              <a:t>The new alert box is now beautiful and follows the graphical charter.</a:t>
+              <a:t>We updated new design of alert box.</a:t>
             </a:r>
           </a:p>
           <a:p>
@@ -3205,7 +3635,7 @@
               <a:buFont typeface="Arial" panose="020B0604020202020204" pitchFamily="34" charset="0"/>
               <a:buNone/>
             </a:pPr>
-            <a:endParaRPr lang="th-TH" sz="1800" b="0" i="0" u="none" strike="noStrike" cap="none" baseline="0" dirty="0" smtClean="0">
+            <a:endParaRPr lang="th-TH" sz="1800" b="0" i="0" u="none" strike="noStrike" cap="none" baseline="0" dirty="0">
               <a:solidFill>
                 <a:schemeClr val="dk1"/>
               </a:solidFill>
@@ -3225,7 +3655,7 @@
               <a:buNone/>
             </a:pPr>
             <a:r>
-              <a:rPr lang="en-US" sz="1800" b="0" i="0" u="none" strike="noStrike" cap="none" baseline="0" dirty="0" smtClean="0">
+              <a:rPr lang="en-US" sz="1800" b="1" i="0" u="sng" strike="noStrike" cap="none" baseline="0" dirty="0">
                 <a:solidFill>
                   <a:schemeClr val="dk1"/>
                 </a:solidFill>
@@ -3234,7 +3664,31 @@
                 <a:cs typeface="Calibri"/>
                 <a:sym typeface="Calibri"/>
               </a:rPr>
-              <a:t>When I demo</a:t>
+              <a:t>*** When I demo </a:t>
+            </a:r>
+            <a:r>
+              <a:rPr lang="th-TH" sz="1800" b="1" i="0" u="sng" strike="noStrike" cap="none" baseline="0" dirty="0">
+                <a:solidFill>
+                  <a:schemeClr val="dk1"/>
+                </a:solidFill>
+                <a:latin typeface="Calibri"/>
+                <a:ea typeface="Calibri"/>
+                <a:cs typeface="Calibri"/>
+                <a:sym typeface="Calibri"/>
+              </a:rPr>
+              <a:t>พูดตอนต้องการจะบอกสีในหน้า </a:t>
+            </a:r>
+            <a:r>
+              <a:rPr lang="en-US" sz="1800" b="1" i="0" u="sng" strike="noStrike" cap="none" baseline="0" dirty="0">
+                <a:solidFill>
+                  <a:schemeClr val="dk1"/>
+                </a:solidFill>
+                <a:latin typeface="Calibri"/>
+                <a:ea typeface="Calibri"/>
+                <a:cs typeface="Calibri"/>
+                <a:sym typeface="Calibri"/>
+              </a:rPr>
+              <a:t>tab validator</a:t>
             </a:r>
           </a:p>
           <a:p>
@@ -3247,7 +3701,7 @@
               <a:buChar char="•"/>
             </a:pPr>
             <a:r>
-              <a:rPr lang="en-US" sz="1800" b="0" i="0" u="none" strike="noStrike" cap="none" baseline="0" dirty="0" smtClean="0">
+              <a:rPr lang="en-US" sz="1800" b="0" i="0" u="none" strike="noStrike" cap="none" baseline="0" dirty="0">
                 <a:solidFill>
                   <a:schemeClr val="dk1"/>
                 </a:solidFill>
@@ -3269,7 +3723,7 @@
               <a:buChar char="•"/>
             </a:pPr>
             <a:r>
-              <a:rPr lang="en-US" sz="1800" b="0" i="0" u="none" strike="noStrike" cap="none" baseline="0" dirty="0" smtClean="0">
+              <a:rPr lang="en-US" sz="1800" b="0" i="0" u="none" strike="noStrike" cap="none" baseline="0" dirty="0">
                 <a:solidFill>
                   <a:schemeClr val="dk1"/>
                 </a:solidFill>
@@ -3475,7 +3929,7 @@
               <a:buChar char="-"/>
             </a:pPr>
             <a:r>
-              <a:rPr lang="en-US" sz="1200" b="0" i="0" u="none" strike="noStrike" cap="none" baseline="0" dirty="0" smtClean="0">
+              <a:rPr lang="en-US" sz="1200" b="0" i="0" u="none" strike="noStrike" cap="none" baseline="0" dirty="0">
                 <a:solidFill>
                   <a:schemeClr val="dk1"/>
                 </a:solidFill>
@@ -3484,7 +3938,7 @@
                 <a:cs typeface="Calibri"/>
                 <a:sym typeface="Calibri"/>
               </a:rPr>
-              <a:t>So we can’t finish audit trail service and audit trail in product </a:t>
+              <a:t>So we couldn't to finish audit trail service and audit trail in product </a:t>
             </a:r>
             <a:endParaRPr lang="th-TH" sz="1200" b="0" i="0" u="none" strike="noStrike" cap="none" baseline="0" dirty="0">
               <a:solidFill>
@@ -3679,15 +4133,42 @@
               <a:buSzPct val="25000"/>
               <a:buNone/>
             </a:pPr>
-            <a:endParaRPr lang="en-US" sz="1200" b="0" i="0" u="none" strike="noStrike" cap="none" dirty="0">
-              <a:solidFill>
-                <a:schemeClr val="dk1"/>
-              </a:solidFill>
-              <a:latin typeface="Calibri"/>
-              <a:ea typeface="Calibri"/>
-              <a:cs typeface="Calibri"/>
-              <a:sym typeface="Calibri"/>
-            </a:endParaRPr>
+            <a:r>
+              <a:rPr lang="en-US" sz="1200" b="0" i="0" u="none" strike="noStrike" cap="none" dirty="0">
+                <a:solidFill>
+                  <a:schemeClr val="dk1"/>
+                </a:solidFill>
+                <a:latin typeface="Calibri"/>
+                <a:ea typeface="Calibri"/>
+                <a:cs typeface="Calibri"/>
+                <a:sym typeface="Calibri"/>
+              </a:rPr>
+              <a:t>In the first phase (</a:t>
+            </a:r>
+            <a:r>
+              <a:rPr lang="th-TH" sz="1200" b="0" i="0" u="none" strike="noStrike" cap="none" dirty="0">
+                <a:solidFill>
+                  <a:schemeClr val="dk1"/>
+                </a:solidFill>
+                <a:latin typeface="Calibri"/>
+                <a:ea typeface="Calibri"/>
+                <a:cs typeface="Calibri"/>
+                <a:sym typeface="Calibri"/>
+              </a:rPr>
+              <a:t>เฟซ</a:t>
+            </a:r>
+            <a:r>
+              <a:rPr lang="en-US" sz="1200" b="0" i="0" u="none" strike="noStrike" cap="none" dirty="0">
+                <a:solidFill>
+                  <a:schemeClr val="dk1"/>
+                </a:solidFill>
+                <a:latin typeface="Calibri"/>
+                <a:ea typeface="Calibri"/>
+                <a:cs typeface="Calibri"/>
+                <a:sym typeface="Calibri"/>
+              </a:rPr>
+              <a:t>) we have to spend time doing in back-end for provide data to front-end so that we couldn’t to burn point.</a:t>
+            </a:r>
           </a:p>
         </p:txBody>
       </p:sp>
@@ -3872,15 +4353,66 @@
               <a:buSzPct val="25000"/>
               <a:buNone/>
             </a:pPr>
-            <a:endParaRPr lang="en-US" sz="1200" b="0" i="0" u="none" strike="noStrike" cap="none" dirty="0">
-              <a:solidFill>
-                <a:schemeClr val="dk1"/>
-              </a:solidFill>
-              <a:latin typeface="Calibri"/>
-              <a:ea typeface="Calibri"/>
-              <a:cs typeface="Calibri"/>
-              <a:sym typeface="Calibri"/>
-            </a:endParaRPr>
+            <a:r>
+              <a:rPr lang="en-US" sz="1200" b="0" i="0" u="none" strike="noStrike" cap="none" dirty="0">
+                <a:solidFill>
+                  <a:schemeClr val="dk1"/>
+                </a:solidFill>
+                <a:latin typeface="Calibri"/>
+                <a:ea typeface="Calibri"/>
+                <a:cs typeface="Calibri"/>
+                <a:sym typeface="Calibri"/>
+              </a:rPr>
+              <a:t>The target velocity is 67 and achieved (</a:t>
+            </a:r>
+            <a:r>
+              <a:rPr lang="th-TH" sz="1200" b="1" i="0" u="none" strike="noStrike" cap="none" dirty="0">
+                <a:solidFill>
+                  <a:schemeClr val="dk1"/>
+                </a:solidFill>
+                <a:latin typeface="Calibri"/>
+                <a:ea typeface="Calibri"/>
+                <a:cs typeface="Calibri"/>
+                <a:sym typeface="Calibri"/>
+              </a:rPr>
+              <a:t>แอ๊ค</a:t>
+            </a:r>
+            <a:r>
+              <a:rPr lang="en-US" sz="1200" b="1" i="0" u="none" strike="noStrike" cap="none" dirty="0">
+                <a:solidFill>
+                  <a:schemeClr val="dk1"/>
+                </a:solidFill>
+                <a:latin typeface="Calibri"/>
+                <a:ea typeface="Calibri"/>
+                <a:cs typeface="Calibri"/>
+                <a:sym typeface="Calibri"/>
+              </a:rPr>
+              <a:t>-</a:t>
+            </a:r>
+            <a:r>
+              <a:rPr lang="th-TH" sz="1200" b="1" i="0" u="none" strike="noStrike" cap="none" dirty="0">
+                <a:solidFill>
+                  <a:schemeClr val="dk1"/>
+                </a:solidFill>
+                <a:latin typeface="Calibri"/>
+                <a:ea typeface="Calibri"/>
+                <a:cs typeface="Calibri"/>
+                <a:sym typeface="Calibri"/>
+              </a:rPr>
+              <a:t>ชีฟ</a:t>
+            </a:r>
+            <a:r>
+              <a:rPr lang="en-US" sz="1200" b="0" i="0" u="none" strike="noStrike" cap="none" dirty="0">
+                <a:solidFill>
+                  <a:schemeClr val="dk1"/>
+                </a:solidFill>
+                <a:latin typeface="Calibri"/>
+                <a:ea typeface="Calibri"/>
+                <a:cs typeface="Calibri"/>
+                <a:sym typeface="Calibri"/>
+              </a:rPr>
+              <a:t>) velocity is 68</a:t>
+            </a:r>
           </a:p>
         </p:txBody>
       </p:sp>
@@ -4065,15 +4597,66 @@
               <a:buSzPct val="25000"/>
               <a:buNone/>
             </a:pPr>
-            <a:endParaRPr lang="en-US" sz="1200" b="0" i="0" u="none" strike="noStrike" cap="none" dirty="0">
-              <a:solidFill>
-                <a:schemeClr val="dk1"/>
-              </a:solidFill>
-              <a:latin typeface="Calibri"/>
-              <a:ea typeface="Calibri"/>
-              <a:cs typeface="Calibri"/>
-              <a:sym typeface="Calibri"/>
-            </a:endParaRPr>
+            <a:r>
+              <a:rPr lang="en-US" sz="1200" b="0" i="0" u="none" strike="noStrike" cap="none" dirty="0">
+                <a:solidFill>
+                  <a:schemeClr val="dk1"/>
+                </a:solidFill>
+                <a:latin typeface="Calibri"/>
+                <a:ea typeface="Calibri"/>
+                <a:cs typeface="Calibri"/>
+                <a:sym typeface="Calibri"/>
+              </a:rPr>
+              <a:t>Normalized </a:t>
+            </a:r>
+            <a:r>
+              <a:rPr lang="en-US" sz="1200" b="1" i="0" u="none" strike="noStrike" cap="none" dirty="0">
+                <a:solidFill>
+                  <a:schemeClr val="dk1"/>
+                </a:solidFill>
+                <a:latin typeface="Calibri"/>
+                <a:ea typeface="Calibri"/>
+                <a:cs typeface="Calibri"/>
+                <a:sym typeface="Calibri"/>
+              </a:rPr>
+              <a:t>(</a:t>
+            </a:r>
+            <a:r>
+              <a:rPr lang="th-TH" sz="1200" b="1" i="0" u="none" strike="noStrike" cap="none" dirty="0">
+                <a:solidFill>
+                  <a:schemeClr val="dk1"/>
+                </a:solidFill>
+                <a:latin typeface="Calibri"/>
+                <a:ea typeface="Calibri"/>
+                <a:cs typeface="Calibri"/>
+                <a:sym typeface="Calibri"/>
+              </a:rPr>
+              <a:t>โนโมไลส์ท</a:t>
+            </a:r>
+            <a:r>
+              <a:rPr lang="en-US" sz="1200" b="1" i="0" u="none" strike="noStrike" cap="none" dirty="0">
+                <a:solidFill>
+                  <a:schemeClr val="dk1"/>
+                </a:solidFill>
+                <a:latin typeface="Calibri"/>
+                <a:ea typeface="Calibri"/>
+                <a:cs typeface="Calibri"/>
+                <a:sym typeface="Calibri"/>
+              </a:rPr>
+              <a:t>)</a:t>
+            </a:r>
+            <a:r>
+              <a:rPr lang="en-US" sz="1200" b="0" i="0" u="none" strike="noStrike" cap="none" dirty="0">
+                <a:solidFill>
+                  <a:schemeClr val="dk1"/>
+                </a:solidFill>
+                <a:latin typeface="Calibri"/>
+                <a:ea typeface="Calibri"/>
+                <a:cs typeface="Calibri"/>
+                <a:sym typeface="Calibri"/>
+              </a:rPr>
+              <a:t> velocity is 71</a:t>
+            </a:r>
           </a:p>
         </p:txBody>
       </p:sp>
@@ -14685,18 +15268,6 @@
               </a:rPr>
               <a:t>Sprint review</a:t>
             </a:r>
-            <a:r>
-              <a:rPr lang="en-US" sz="4400" b="1" i="0" u="none" strike="noStrike" cap="none" dirty="0">
-                <a:solidFill>
-                  <a:schemeClr val="dk1"/>
-                </a:solidFill>
-                <a:latin typeface="Calibri"/>
-                <a:ea typeface="Calibri"/>
-                <a:cs typeface="Calibri"/>
-                <a:sym typeface="Calibri"/>
-              </a:rPr>
-              <a:t/>
-            </a:r>
             <a:br>
               <a:rPr lang="en-US" sz="4400" b="1" i="0" u="none" strike="noStrike" cap="none" dirty="0">
                 <a:solidFill>
@@ -14718,26 +15289,14 @@
                 <a:cs typeface="Calibri"/>
                 <a:sym typeface="Calibri"/>
               </a:rPr>
-              <a:t>Sprint: </a:t>
-            </a:r>
-            <a:r>
-              <a:rPr lang="en-US" sz="4000" b="1" i="0" u="none" strike="noStrike" cap="none" dirty="0" smtClean="0">
-                <a:solidFill>
-                  <a:schemeClr val="dk1"/>
-                </a:solidFill>
-                <a:latin typeface="Calibri"/>
-                <a:ea typeface="Calibri"/>
-                <a:cs typeface="Calibri"/>
-                <a:sym typeface="Calibri"/>
-              </a:rPr>
-              <a:t>2</a:t>
+              <a:t>Sprint: 2</a:t>
             </a:r>
             <a:r>
               <a:rPr lang="en-US" sz="4000" b="1" dirty="0"/>
               <a:t>6</a:t>
             </a:r>
             <a:r>
-              <a:rPr lang="en-US" sz="4000" b="1" i="0" u="none" strike="noStrike" cap="none" dirty="0" smtClean="0">
+              <a:rPr lang="en-US" sz="4000" b="1" i="0" u="none" strike="noStrike" cap="none" dirty="0">
                 <a:solidFill>
                   <a:schemeClr val="dk1"/>
                 </a:solidFill>
@@ -14746,19 +15305,7 @@
                 <a:cs typeface="Calibri"/>
                 <a:sym typeface="Calibri"/>
               </a:rPr>
-              <a:t> </a:t>
-            </a:r>
-            <a:r>
-              <a:rPr lang="en-US" sz="4000" b="1" i="0" u="none" strike="noStrike" cap="none" dirty="0">
-                <a:solidFill>
-                  <a:schemeClr val="dk1"/>
-                </a:solidFill>
-                <a:latin typeface="Calibri"/>
-                <a:ea typeface="Calibri"/>
-                <a:cs typeface="Calibri"/>
-                <a:sym typeface="Calibri"/>
-              </a:rPr>
-              <a:t>– Team: </a:t>
+              <a:t> – Team: </a:t>
             </a:r>
             <a:r>
               <a:rPr lang="en-US" sz="4000" b="1" dirty="0" err="1"/>
@@ -14916,13 +15463,6 @@
   <p:clrMapOvr>
     <a:masterClrMapping/>
   </p:clrMapOvr>
-  <p:timing>
-    <p:tnLst>
-      <p:par>
-        <p:cTn id="1" dur="indefinite" restart="never" nodeType="tmRoot"/>
-      </p:par>
-    </p:tnLst>
-  </p:timing>
 </p:sld>
 </file>
 
@@ -15116,13 +15656,6 @@
   <p:transition spd="med">
     <p:fade/>
   </p:transition>
-  <p:timing>
-    <p:tnLst>
-      <p:par>
-        <p:cTn id="1" dur="indefinite" restart="never" nodeType="tmRoot"/>
-      </p:par>
-    </p:tnLst>
-  </p:timing>
 </p:sld>
 </file>
 
@@ -15316,13 +15849,6 @@
   <p:transition spd="med">
     <p:fade/>
   </p:transition>
-  <p:timing>
-    <p:tnLst>
-      <p:par>
-        <p:cTn id="1" dur="indefinite" restart="never" nodeType="tmRoot"/>
-      </p:par>
-    </p:tnLst>
-  </p:timing>
 </p:sld>
 </file>
 
@@ -15516,13 +16042,6 @@
   <p:transition spd="med">
     <p:fade/>
   </p:transition>
-  <p:timing>
-    <p:tnLst>
-      <p:par>
-        <p:cTn id="1" dur="indefinite" restart="never" nodeType="tmRoot"/>
-      </p:par>
-    </p:tnLst>
-  </p:timing>
 </p:sld>
 </file>
 
@@ -15770,7 +16289,7 @@
               <a:buChar char="•"/>
             </a:pPr>
             <a:r>
-              <a:rPr lang="en-US" sz="1800" u="sng" dirty="0" smtClean="0">
+              <a:rPr lang="en-US" sz="1800" u="sng" dirty="0">
                 <a:solidFill>
                   <a:schemeClr val="hlink"/>
                 </a:solidFill>
@@ -15871,13 +16390,6 @@
   <p:transition spd="med">
     <p:fade/>
   </p:transition>
-  <p:timing>
-    <p:tnLst>
-      <p:par>
-        <p:cTn id="1" dur="indefinite" restart="never" nodeType="tmRoot"/>
-      </p:par>
-    </p:tnLst>
-  </p:timing>
 </p:sld>
 </file>
 
@@ -16122,8 +16634,8 @@
         </p:nvSpPr>
         <p:spPr>
           <a:xfrm>
-            <a:off x="9270232" y="3135852"/>
-            <a:ext cx="2488500" cy="1200300"/>
+            <a:off x="9270232" y="3135851"/>
+            <a:ext cx="2488500" cy="3220495"/>
           </a:xfrm>
           <a:prstGeom prst="rect">
             <a:avLst/>
@@ -16151,7 +16663,7 @@
               <a:buChar char="•"/>
             </a:pPr>
             <a:r>
-              <a:rPr lang="en-US" sz="1200" b="0" i="0" u="none" strike="noStrike" cap="none">
+              <a:rPr lang="en-US" sz="1600" b="0" i="0" u="none" strike="noStrike" cap="none" dirty="0">
                 <a:solidFill>
                   <a:schemeClr val="dk1"/>
                 </a:solidFill>
@@ -16176,7 +16688,7 @@
               <a:buChar char="•"/>
             </a:pPr>
             <a:r>
-              <a:rPr lang="en-US" sz="1200" b="0" i="0" u="none" strike="noStrike" cap="none">
+              <a:rPr lang="en-US" sz="1600" b="0" i="0" u="none" strike="noStrike" cap="none" dirty="0">
                 <a:solidFill>
                   <a:schemeClr val="dk1"/>
                 </a:solidFill>
@@ -16201,57 +16713,7 @@
               <a:buChar char="•"/>
             </a:pPr>
             <a:r>
-              <a:rPr lang="en-US" sz="1200" b="0" i="0" u="none" strike="noStrike" cap="none">
-                <a:solidFill>
-                  <a:schemeClr val="dk1"/>
-                </a:solidFill>
-                <a:latin typeface="Calibri"/>
-                <a:ea typeface="Calibri"/>
-                <a:cs typeface="Calibri"/>
-                <a:sym typeface="Calibri"/>
-              </a:rPr>
-              <a:t>Stories</a:t>
-            </a:r>
-          </a:p>
-          <a:p>
-            <a:pPr marL="228600" marR="0" lvl="2" indent="-228600" algn="l" rtl="0">
-              <a:spcBef>
-                <a:spcPts val="0"/>
-              </a:spcBef>
-              <a:buClr>
-                <a:schemeClr val="dk1"/>
-              </a:buClr>
-              <a:buSzPct val="100000"/>
-              <a:buFont typeface="Arial"/>
-              <a:buChar char="•"/>
-            </a:pPr>
-            <a:r>
-              <a:rPr lang="en-US" sz="1200" b="0" i="0" u="none" strike="noStrike" cap="none">
-                <a:solidFill>
-                  <a:schemeClr val="dk1"/>
-                </a:solidFill>
-                <a:latin typeface="Calibri"/>
-                <a:ea typeface="Calibri"/>
-                <a:cs typeface="Calibri"/>
-                <a:sym typeface="Calibri"/>
-              </a:rPr>
-              <a:t>UAT bugs</a:t>
-            </a:r>
-          </a:p>
-          <a:p>
-            <a:pPr marL="228600" marR="0" lvl="2" indent="-228600" algn="l" rtl="0">
-              <a:spcBef>
-                <a:spcPts val="0"/>
-              </a:spcBef>
-              <a:buClr>
-                <a:schemeClr val="dk1"/>
-              </a:buClr>
-              <a:buSzPct val="100000"/>
-              <a:buFont typeface="Arial"/>
-              <a:buChar char="•"/>
-            </a:pPr>
-            <a:r>
-              <a:rPr lang="en-US" sz="1200" b="0" i="0" u="none" strike="noStrike" cap="none">
+              <a:rPr lang="en-US" sz="1600" b="0" i="0" u="none" strike="noStrike" cap="none" dirty="0">
                 <a:solidFill>
                   <a:schemeClr val="dk1"/>
                 </a:solidFill>
@@ -16272,11 +16734,36 @@
                 <a:schemeClr val="dk1"/>
               </a:buClr>
               <a:buSzPct val="100000"/>
-              <a:buFont typeface="Calibri"/>
+              <a:buFont typeface="Arial"/>
               <a:buChar char="•"/>
             </a:pPr>
             <a:r>
-              <a:rPr lang="en-US" sz="1200">
+              <a:rPr lang="en-US" sz="1600" dirty="0">
+                <a:solidFill>
+                  <a:schemeClr val="dk1"/>
+                </a:solidFill>
+                <a:latin typeface="Calibri"/>
+                <a:ea typeface="Calibri"/>
+                <a:cs typeface="Calibri"/>
+                <a:sym typeface="Calibri"/>
+              </a:rPr>
+              <a:t>Sprint Bugs/Problem</a:t>
+            </a:r>
+          </a:p>
+          <a:p>
+            <a:pPr marL="228600" marR="0" lvl="2" indent="-228600" algn="l" rtl="0">
+              <a:spcBef>
+                <a:spcPts val="0"/>
+              </a:spcBef>
+              <a:buClr>
+                <a:schemeClr val="dk1"/>
+              </a:buClr>
+              <a:buSzPct val="100000"/>
+              <a:buFont typeface="Arial"/>
+              <a:buChar char="•"/>
+            </a:pPr>
+            <a:r>
+              <a:rPr lang="en-US" sz="1600" dirty="0">
                 <a:solidFill>
                   <a:schemeClr val="dk1"/>
                 </a:solidFill>
@@ -16297,11 +16784,11 @@
                 <a:schemeClr val="dk1"/>
               </a:buClr>
               <a:buSzPct val="100000"/>
-              <a:buFont typeface="Calibri"/>
+              <a:buFont typeface="Arial"/>
               <a:buChar char="•"/>
             </a:pPr>
             <a:r>
-              <a:rPr lang="en-US" sz="1200">
+              <a:rPr lang="en-US" sz="1600" dirty="0">
                 <a:solidFill>
                   <a:schemeClr val="dk1"/>
                 </a:solidFill>
@@ -16324,7 +16811,7 @@
               <a:buFont typeface="Arial"/>
               <a:buNone/>
             </a:pPr>
-            <a:endParaRPr sz="1200" b="0" i="0" u="none" strike="noStrike" cap="none">
+            <a:endParaRPr sz="1200" b="0" i="0" u="none" strike="noStrike" cap="none" dirty="0">
               <a:solidFill>
                 <a:schemeClr val="dk1"/>
               </a:solidFill>
@@ -16480,13 +16967,6 @@
   <p:transition spd="med">
     <p:fade/>
   </p:transition>
-  <p:timing>
-    <p:tnLst>
-      <p:par>
-        <p:cTn id="1" dur="indefinite" restart="never" nodeType="tmRoot"/>
-      </p:par>
-    </p:tnLst>
-  </p:timing>
 </p:sld>
 </file>
 
@@ -16597,7 +17077,7 @@
         <p:spPr>
           <a:xfrm>
             <a:off x="910775" y="1241050"/>
-            <a:ext cx="10370400" cy="5115300"/>
+            <a:ext cx="10370400" cy="5480400"/>
           </a:xfrm>
           <a:prstGeom prst="rect">
             <a:avLst/>
@@ -17123,7 +17603,7 @@
               </a:rPr>
               <a:t>Nanees</a:t>
             </a:r>
-            <a:endParaRPr lang="en-US" sz="2220" b="0" i="0" u="none" strike="noStrike" cap="none" dirty="0">
+            <a:endParaRPr lang="en-US" sz="2220" dirty="0">
               <a:solidFill>
                 <a:schemeClr val="dk1"/>
               </a:solidFill>
@@ -17132,6 +17612,37 @@
               <a:cs typeface="Calibri"/>
               <a:sym typeface="Calibri"/>
             </a:endParaRPr>
+          </a:p>
+          <a:p>
+            <a:pPr marL="914400" marR="0" lvl="0" indent="-369569" algn="l" rtl="0">
+              <a:lnSpc>
+                <a:spcPct val="80000"/>
+              </a:lnSpc>
+              <a:spcBef>
+                <a:spcPts val="500"/>
+              </a:spcBef>
+              <a:spcAft>
+                <a:spcPts val="0"/>
+              </a:spcAft>
+              <a:buClr>
+                <a:schemeClr val="dk1"/>
+              </a:buClr>
+              <a:buSzPct val="100909"/>
+              <a:buFont typeface="Calibri"/>
+              <a:buAutoNum type="arabicPeriod"/>
+            </a:pPr>
+            <a:r>
+              <a:rPr lang="en-US" sz="2220" b="0" i="0" u="none" strike="noStrike" cap="none" dirty="0">
+                <a:solidFill>
+                  <a:schemeClr val="dk1"/>
+                </a:solidFill>
+                <a:latin typeface="Calibri"/>
+                <a:ea typeface="Calibri"/>
+                <a:cs typeface="Calibri"/>
+                <a:sym typeface="Calibri"/>
+              </a:rPr>
+              <a:t> Air</a:t>
+            </a:r>
           </a:p>
           <a:p>
             <a:pPr marL="457200" marR="0" lvl="1" indent="0" algn="l" rtl="0">
@@ -17264,13 +17775,6 @@
   <p:transition spd="med">
     <p:fade/>
   </p:transition>
-  <p:timing>
-    <p:tnLst>
-      <p:par>
-        <p:cTn id="1" dur="indefinite" restart="never" nodeType="tmRoot"/>
-      </p:par>
-    </p:tnLst>
-  </p:timing>
 </p:sld>
 </file>
 
@@ -17413,11 +17917,7 @@
             </a:pPr>
             <a:r>
               <a:rPr lang="en-US" sz="2400" dirty="0"/>
-              <a:t>Continuation and completion of product </a:t>
-            </a:r>
-            <a:r>
-              <a:rPr lang="en-US" sz="2400" dirty="0" smtClean="0"/>
-              <a:t>management</a:t>
+              <a:t>Continuation and completion of product management</a:t>
             </a:r>
           </a:p>
           <a:p>
@@ -17437,15 +17937,7 @@
             </a:pPr>
             <a:r>
               <a:rPr lang="en-US" sz="2400" dirty="0"/>
-              <a:t>U</a:t>
-            </a:r>
-            <a:r>
-              <a:rPr lang="en-US" sz="2400" dirty="0" smtClean="0"/>
-              <a:t>pdate </a:t>
-            </a:r>
-            <a:r>
-              <a:rPr lang="en-US" sz="2400" dirty="0"/>
-              <a:t>of </a:t>
+              <a:t>Update of </a:t>
             </a:r>
             <a:r>
               <a:rPr lang="en-US" sz="2400" dirty="0" err="1"/>
@@ -17453,11 +17945,7 @@
             </a:r>
             <a:r>
               <a:rPr lang="en-US" sz="2400" dirty="0"/>
-              <a:t> </a:t>
-            </a:r>
-            <a:r>
-              <a:rPr lang="en-US" sz="2400" dirty="0" smtClean="0"/>
-              <a:t>reporting</a:t>
+              <a:t> reporting</a:t>
             </a:r>
             <a:endParaRPr lang="en-US" sz="2400" dirty="0">
               <a:solidFill>
@@ -17543,7 +18031,7 @@
               <a:t>Committed functionalities: </a:t>
             </a:r>
             <a:r>
-              <a:rPr lang="en-US" sz="2400" dirty="0" smtClean="0">
+              <a:rPr lang="en-US" sz="2400" dirty="0">
                 <a:solidFill>
                   <a:srgbClr val="00B050"/>
                 </a:solidFill>
@@ -17579,7 +18067,7 @@
               <a:t>1</a:t>
             </a:r>
             <a:r>
-              <a:rPr lang="en-US" sz="2400" b="0" i="0" u="none" strike="noStrike" cap="none" dirty="0" smtClean="0">
+              <a:rPr lang="en-US" sz="2400" b="0" i="0" u="none" strike="noStrike" cap="none" dirty="0">
                 <a:solidFill>
                   <a:srgbClr val="00B050"/>
                 </a:solidFill>
@@ -17588,19 +18076,7 @@
                 <a:cs typeface="Calibri"/>
                 <a:sym typeface="Calibri"/>
               </a:rPr>
-              <a:t> </a:t>
-            </a:r>
-            <a:r>
-              <a:rPr lang="en-US" sz="2400" b="0" i="0" u="none" strike="noStrike" cap="none" dirty="0">
-                <a:solidFill>
-                  <a:srgbClr val="00B050"/>
-                </a:solidFill>
-                <a:latin typeface="Calibri"/>
-                <a:ea typeface="Calibri"/>
-                <a:cs typeface="Calibri"/>
-                <a:sym typeface="Calibri"/>
-              </a:rPr>
-              <a:t>Non-US</a:t>
+              <a:t> Non-US</a:t>
             </a:r>
           </a:p>
           <a:p>
@@ -17634,7 +18110,7 @@
               <a:t>Committed Story Points: </a:t>
             </a:r>
             <a:r>
-              <a:rPr lang="en-US" sz="2400" dirty="0" smtClean="0">
+              <a:rPr lang="en-US" sz="2400" dirty="0">
                 <a:solidFill>
                   <a:srgbClr val="00B050"/>
                 </a:solidFill>
@@ -17695,7 +18171,7 @@
               <a:t> </a:t>
             </a:r>
             <a:r>
-              <a:rPr lang="en-US" sz="2400" dirty="0" smtClean="0">
+              <a:rPr lang="en-US" sz="2400" dirty="0">
                 <a:solidFill>
                   <a:srgbClr val="00B050"/>
                 </a:solidFill>
@@ -17707,7 +18183,7 @@
               <a:t>2 US, </a:t>
             </a:r>
             <a:r>
-              <a:rPr lang="th-TH" sz="2400" dirty="0" smtClean="0">
+              <a:rPr lang="th-TH" sz="2400" dirty="0">
                 <a:solidFill>
                   <a:srgbClr val="FF0000"/>
                 </a:solidFill>
@@ -17719,7 +18195,7 @@
               <a:t>-2 </a:t>
             </a:r>
             <a:r>
-              <a:rPr lang="en-US" sz="2400" dirty="0" smtClean="0">
+              <a:rPr lang="en-US" sz="2400" dirty="0">
                 <a:solidFill>
                   <a:srgbClr val="FF0000"/>
                 </a:solidFill>
@@ -17731,7 +18207,7 @@
               <a:t>US</a:t>
             </a:r>
             <a:r>
-              <a:rPr lang="en-US" sz="2400" dirty="0" smtClean="0">
+              <a:rPr lang="en-US" sz="2400" dirty="0">
                 <a:solidFill>
                   <a:srgbClr val="00B050"/>
                 </a:solidFill>
@@ -17740,19 +18216,7 @@
                 <a:cs typeface="Calibri"/>
                 <a:sym typeface="Calibri"/>
               </a:rPr>
-              <a:t>, 5 </a:t>
-            </a:r>
-            <a:r>
-              <a:rPr lang="en-US" sz="2400" dirty="0">
-                <a:solidFill>
-                  <a:srgbClr val="00B050"/>
-                </a:solidFill>
-                <a:latin typeface="Calibri"/>
-                <a:ea typeface="Calibri"/>
-                <a:cs typeface="Calibri"/>
-                <a:sym typeface="Calibri"/>
-              </a:rPr>
-              <a:t>Non-US</a:t>
+              <a:t>, 5 Non-US</a:t>
             </a:r>
           </a:p>
           <a:p>
@@ -17829,7 +18293,7 @@
               <a:t>Story points completed: </a:t>
             </a:r>
             <a:r>
-              <a:rPr lang="en-US" sz="2400" dirty="0" smtClean="0">
+              <a:rPr lang="en-US" sz="2400" dirty="0">
                 <a:solidFill>
                   <a:srgbClr val="00B050"/>
                 </a:solidFill>
@@ -17841,7 +18305,7 @@
               <a:t>67</a:t>
             </a:r>
             <a:r>
-              <a:rPr lang="en-US" sz="2400" b="0" i="0" u="none" strike="noStrike" cap="none" dirty="0" smtClean="0">
+              <a:rPr lang="en-US" sz="2400" b="0" i="0" u="none" strike="noStrike" cap="none" dirty="0">
                 <a:solidFill>
                   <a:srgbClr val="00B050"/>
                 </a:solidFill>
@@ -17850,19 +18314,7 @@
                 <a:cs typeface="Calibri"/>
                 <a:sym typeface="Calibri"/>
               </a:rPr>
-              <a:t> </a:t>
-            </a:r>
-            <a:r>
-              <a:rPr lang="en-US" sz="2400" b="0" i="0" u="none" strike="noStrike" cap="none" dirty="0">
-                <a:solidFill>
-                  <a:srgbClr val="00B050"/>
-                </a:solidFill>
-                <a:latin typeface="Calibri"/>
-                <a:ea typeface="Calibri"/>
-                <a:cs typeface="Calibri"/>
-                <a:sym typeface="Calibri"/>
-              </a:rPr>
-              <a:t>points</a:t>
+              <a:t> points</a:t>
             </a:r>
           </a:p>
           <a:p>
@@ -17893,7 +18345,7 @@
               <a:t>Completed: </a:t>
             </a:r>
             <a:r>
-              <a:rPr lang="en-US" sz="2400" dirty="0" smtClean="0">
+              <a:rPr lang="en-US" sz="2400" dirty="0">
                 <a:solidFill>
                   <a:srgbClr val="00B050"/>
                 </a:solidFill>
@@ -17905,7 +18357,7 @@
               <a:t>3</a:t>
             </a:r>
             <a:r>
-              <a:rPr lang="th-TH" sz="2400" dirty="0" smtClean="0">
+              <a:rPr lang="th-TH" sz="2400" dirty="0">
                 <a:solidFill>
                   <a:srgbClr val="00B050"/>
                 </a:solidFill>
@@ -17917,7 +18369,7 @@
               <a:t>6</a:t>
             </a:r>
             <a:r>
-              <a:rPr lang="en-US" sz="2400" b="0" i="0" u="none" strike="noStrike" cap="none" dirty="0" smtClean="0">
+              <a:rPr lang="en-US" sz="2400" b="0" i="0" u="none" strike="noStrike" cap="none" dirty="0">
                 <a:solidFill>
                   <a:srgbClr val="00B050"/>
                 </a:solidFill>
@@ -17941,7 +18393,7 @@
               <a:t>US, </a:t>
             </a:r>
             <a:r>
-              <a:rPr lang="th-TH" sz="2400" dirty="0" smtClean="0">
+              <a:rPr lang="th-TH" sz="2400" dirty="0">
                 <a:solidFill>
                   <a:srgbClr val="00B050"/>
                 </a:solidFill>
@@ -17953,7 +18405,7 @@
               <a:t>6</a:t>
             </a:r>
             <a:r>
-              <a:rPr lang="en-US" sz="2400" dirty="0" smtClean="0">
+              <a:rPr lang="en-US" sz="2400" dirty="0">
                 <a:solidFill>
                   <a:srgbClr val="00B050"/>
                 </a:solidFill>
@@ -17962,19 +18414,7 @@
                 <a:cs typeface="Calibri"/>
                 <a:sym typeface="Calibri"/>
               </a:rPr>
-              <a:t> </a:t>
-            </a:r>
-            <a:r>
-              <a:rPr lang="en-US" sz="2400" dirty="0">
-                <a:solidFill>
-                  <a:srgbClr val="00B050"/>
-                </a:solidFill>
-                <a:latin typeface="Calibri"/>
-                <a:ea typeface="Calibri"/>
-                <a:cs typeface="Calibri"/>
-                <a:sym typeface="Calibri"/>
-              </a:rPr>
-              <a:t>Non-US</a:t>
+              <a:t> Non-US</a:t>
             </a:r>
           </a:p>
           <a:p>
@@ -18032,7 +18472,7 @@
               <a:t>0</a:t>
             </a:r>
             <a:r>
-              <a:rPr lang="en-US" sz="2400" dirty="0" smtClean="0">
+              <a:rPr lang="en-US" sz="2400" dirty="0">
                 <a:solidFill>
                   <a:srgbClr val="00B050"/>
                 </a:solidFill>
@@ -18040,18 +18480,7 @@
                 <a:cs typeface="Calibri"/>
                 <a:sym typeface="Calibri"/>
               </a:rPr>
-              <a:t> </a:t>
-            </a:r>
-            <a:r>
-              <a:rPr lang="en-US" sz="2400" dirty="0">
-                <a:solidFill>
-                  <a:srgbClr val="00B050"/>
-                </a:solidFill>
-                <a:latin typeface="Calibri"/>
-                <a:cs typeface="Calibri"/>
-                <a:sym typeface="Calibri"/>
-              </a:rPr>
-              <a:t>US</a:t>
+              <a:t> US</a:t>
             </a:r>
           </a:p>
           <a:p>
@@ -18097,7 +18526,7 @@
               <a:t>0</a:t>
             </a:r>
             <a:r>
-              <a:rPr lang="en-US" sz="2400" dirty="0" smtClean="0">
+              <a:rPr lang="en-US" sz="2400" dirty="0">
                 <a:solidFill>
                   <a:srgbClr val="00B050"/>
                 </a:solidFill>
@@ -18105,18 +18534,7 @@
                 <a:cs typeface="Calibri"/>
                 <a:sym typeface="Calibri"/>
               </a:rPr>
-              <a:t> </a:t>
-            </a:r>
-            <a:r>
-              <a:rPr lang="en-US" sz="2400" dirty="0">
-                <a:solidFill>
-                  <a:srgbClr val="00B050"/>
-                </a:solidFill>
-                <a:latin typeface="Calibri"/>
-                <a:cs typeface="Calibri"/>
-                <a:sym typeface="Calibri"/>
-              </a:rPr>
-              <a:t>points</a:t>
+              <a:t> points</a:t>
             </a:r>
           </a:p>
           <a:p>
@@ -18187,7 +18605,7 @@
                 <a:cs typeface="Calibri"/>
                 <a:sym typeface="Calibri"/>
               </a:rPr>
-              <a:t>Sprint 25  Goals</a:t>
+              <a:t>Sprint 26  Goals</a:t>
             </a:r>
           </a:p>
         </p:txBody>
@@ -18302,13 +18720,6 @@
   <p:transition spd="med">
     <p:fade/>
   </p:transition>
-  <p:timing>
-    <p:tnLst>
-      <p:par>
-        <p:cTn id="1" dur="indefinite" restart="never" nodeType="tmRoot"/>
-      </p:par>
-    </p:tnLst>
-  </p:timing>
 </p:sld>
 </file>
 
@@ -18368,11 +18779,7 @@
             </a:pPr>
             <a:r>
               <a:rPr lang="en-US" sz="2400" b="1" u="sng" dirty="0"/>
-              <a:t>Continuation and completion of product </a:t>
-            </a:r>
-            <a:r>
-              <a:rPr lang="en-US" sz="2400" b="1" u="sng" dirty="0" smtClean="0"/>
-              <a:t>management</a:t>
+              <a:t>Continuation and completion of product management</a:t>
             </a:r>
           </a:p>
           <a:p>
@@ -18446,7 +18853,7 @@
               <a:buChar char="Ø"/>
             </a:pPr>
             <a:r>
-              <a:rPr lang="en-US" sz="2000" dirty="0" smtClean="0"/>
+              <a:rPr lang="en-US" sz="2000" dirty="0"/>
               <a:t>Product list page</a:t>
             </a:r>
           </a:p>
@@ -18479,10 +18886,10 @@
               <a:buChar char="•"/>
             </a:pPr>
             <a:r>
-              <a:rPr lang="en-US" sz="1800" dirty="0" smtClean="0"/>
+              <a:rPr lang="en-US" sz="1800" dirty="0"/>
               <a:t>Improved search functionality</a:t>
             </a:r>
-            <a:endParaRPr lang="th-TH" sz="1800" dirty="0" smtClean="0"/>
+            <a:endParaRPr lang="th-TH" sz="1800" dirty="0"/>
           </a:p>
         </p:txBody>
       </p:sp>
@@ -18513,16 +18920,8 @@
               <a:buChar char="Ø"/>
             </a:pPr>
             <a:r>
-              <a:rPr lang="en-US" sz="2000" dirty="0" smtClean="0"/>
-              <a:t>Product detai</a:t>
-            </a:r>
-            <a:r>
               <a:rPr lang="en-US" sz="2000" dirty="0"/>
-              <a:t>l</a:t>
-            </a:r>
-            <a:r>
-              <a:rPr lang="en-US" sz="2000" dirty="0" smtClean="0"/>
-              <a:t> page</a:t>
+              <a:t>Product detail page</a:t>
             </a:r>
           </a:p>
         </p:txBody>
@@ -18554,10 +18953,10 @@
               <a:buChar char="•"/>
             </a:pPr>
             <a:r>
-              <a:rPr lang="en-US" sz="1800" dirty="0" smtClean="0"/>
+              <a:rPr lang="en-US" sz="1800" dirty="0"/>
               <a:t>New alert box.</a:t>
             </a:r>
-            <a:endParaRPr lang="th-TH" sz="1800" dirty="0" smtClean="0"/>
+            <a:endParaRPr lang="th-TH" sz="1800" dirty="0"/>
           </a:p>
         </p:txBody>
       </p:sp>
@@ -18588,10 +18987,9 @@
               <a:buChar char="•"/>
             </a:pPr>
             <a:r>
-              <a:rPr lang="en-US" sz="1800" dirty="0" smtClean="0"/>
+              <a:rPr lang="en-US" sz="1800" dirty="0"/>
               <a:t>Improved sorting and functionality.</a:t>
             </a:r>
-            <a:endParaRPr lang="en-US" sz="1800" dirty="0"/>
           </a:p>
         </p:txBody>
       </p:sp>
@@ -18622,18 +19020,9 @@
               <a:buChar char="•"/>
             </a:pPr>
             <a:r>
-              <a:rPr lang="en-US" sz="1800" dirty="0" smtClean="0"/>
-              <a:t>Added new column Product GUID (Globally </a:t>
+              <a:rPr lang="en-US" sz="1800" dirty="0"/>
+              <a:t>Added new column Product GUID (Globally Unique Identifier)</a:t>
             </a:r>
-            <a:r>
-              <a:rPr lang="en-US" sz="1800" dirty="0"/>
-              <a:t>U</a:t>
-            </a:r>
-            <a:r>
-              <a:rPr lang="en-US" sz="1800" dirty="0" smtClean="0"/>
-              <a:t>nique Identifier)</a:t>
-            </a:r>
-            <a:endParaRPr lang="en-US" sz="1800" dirty="0"/>
           </a:p>
         </p:txBody>
       </p:sp>
@@ -18664,10 +19053,9 @@
               <a:buChar char="•"/>
             </a:pPr>
             <a:r>
-              <a:rPr lang="en-US" sz="1800" dirty="0" smtClean="0"/>
+              <a:rPr lang="en-US" sz="1800" dirty="0"/>
               <a:t>New actions for easy navigation in product details.</a:t>
             </a:r>
-            <a:endParaRPr lang="en-US" sz="1800" dirty="0"/>
           </a:p>
         </p:txBody>
       </p:sp>
@@ -18708,10 +19096,9 @@
               <a:buNone/>
             </a:pPr>
             <a:r>
-              <a:rPr lang="en-US" dirty="0" smtClean="0"/>
+              <a:rPr lang="en-US" dirty="0"/>
               <a:t>5</a:t>
             </a:r>
-            <a:endParaRPr lang="en-US" dirty="0"/>
           </a:p>
         </p:txBody>
       </p:sp>
@@ -18742,10 +19129,9 @@
               <a:buChar char="•"/>
             </a:pPr>
             <a:r>
-              <a:rPr lang="en-US" sz="1800" dirty="0" smtClean="0"/>
+              <a:rPr lang="en-US" sz="1800" dirty="0"/>
               <a:t>Validation, KYC, AML tabs working.</a:t>
             </a:r>
-            <a:endParaRPr lang="en-US" sz="1800" dirty="0"/>
           </a:p>
         </p:txBody>
       </p:sp>
@@ -18850,17 +19236,17 @@
               <a:buChar char="•"/>
             </a:pPr>
             <a:r>
-              <a:rPr lang="en-US" sz="1800" dirty="0" smtClean="0"/>
+              <a:rPr lang="en-US" sz="1800" dirty="0"/>
               <a:t>Added code coverage feature every projects.</a:t>
             </a:r>
-            <a:endParaRPr lang="th-TH" sz="1800" dirty="0" smtClean="0"/>
+            <a:endParaRPr lang="th-TH" sz="1800" dirty="0"/>
           </a:p>
           <a:p>
             <a:pPr marL="285750" indent="-285750">
               <a:buFont typeface="Arial" panose="020B0604020202020204" pitchFamily="34" charset="0"/>
               <a:buChar char="•"/>
             </a:pPr>
-            <a:endParaRPr lang="en-US" sz="1800" dirty="0" smtClean="0"/>
+            <a:endParaRPr lang="en-US" sz="1800" dirty="0"/>
           </a:p>
         </p:txBody>
       </p:sp>
@@ -20215,29 +20601,21 @@
               <a:buChar char="•"/>
             </a:pPr>
             <a:r>
-              <a:rPr lang="en-US" sz="2000" dirty="0" smtClean="0"/>
-              <a:t>Not </a:t>
+              <a:rPr lang="en-US" sz="2000" dirty="0"/>
+              <a:t>Not have enough audit trail information</a:t>
             </a:r>
             <a:r>
-              <a:rPr lang="en-US" sz="2000" dirty="0"/>
-              <a:t>have enough </a:t>
-            </a:r>
-            <a:r>
-              <a:rPr lang="en-US" sz="2000" dirty="0" smtClean="0"/>
-              <a:t>audit trail information</a:t>
-            </a:r>
-            <a:r>
-              <a:rPr lang="en-US" sz="1600" dirty="0" smtClean="0"/>
+              <a:rPr lang="en-US" sz="1600" dirty="0"/>
               <a:t>.</a:t>
             </a:r>
-            <a:endParaRPr lang="th-TH" sz="1600" dirty="0" smtClean="0"/>
+            <a:endParaRPr lang="th-TH" sz="1600" dirty="0"/>
           </a:p>
           <a:p>
             <a:pPr marL="285750" indent="-285750">
               <a:buFont typeface="Arial" panose="020B0604020202020204" pitchFamily="34" charset="0"/>
               <a:buChar char="•"/>
             </a:pPr>
-            <a:endParaRPr lang="en-US" sz="1600" dirty="0" smtClean="0"/>
+            <a:endParaRPr lang="en-US" sz="1600" dirty="0"/>
           </a:p>
         </p:txBody>
       </p:sp>
@@ -20569,13 +20947,6 @@
   <p:transition spd="med">
     <p:fade/>
   </p:transition>
-  <p:timing>
-    <p:tnLst>
-      <p:par>
-        <p:cTn id="1" dur="indefinite" restart="never" nodeType="tmRoot"/>
-      </p:par>
-    </p:tnLst>
-  </p:timing>
 </p:sld>
 </file>
 
@@ -20724,22 +21095,10 @@
                 <a:cs typeface="Calibri"/>
                 <a:sym typeface="Calibri"/>
               </a:rPr>
-              <a:t>Target velocity: </a:t>
+              <a:t>Target velocity: 6</a:t>
             </a:r>
             <a:r>
-              <a:rPr lang="en-US" sz="2000" dirty="0" smtClean="0">
-                <a:solidFill>
-                  <a:schemeClr val="dk1"/>
-                </a:solidFill>
-                <a:latin typeface="Calibri"/>
-                <a:ea typeface="Calibri"/>
-                <a:cs typeface="Calibri"/>
-                <a:sym typeface="Calibri"/>
-              </a:rPr>
-              <a:t>6</a:t>
-            </a:r>
-            <a:r>
-              <a:rPr lang="th-TH" sz="2000" dirty="0" smtClean="0">
+              <a:rPr lang="th-TH" sz="2000" dirty="0">
                 <a:solidFill>
                   <a:schemeClr val="dk1"/>
                 </a:solidFill>
@@ -20751,7 +21110,7 @@
               <a:t>7</a:t>
             </a:r>
             <a:r>
-              <a:rPr lang="en-US" sz="2000" dirty="0" smtClean="0">
+              <a:rPr lang="en-US" sz="2000" dirty="0">
                 <a:solidFill>
                   <a:schemeClr val="dk1"/>
                 </a:solidFill>
@@ -20760,34 +21119,10 @@
                 <a:cs typeface="Calibri"/>
                 <a:sym typeface="Calibri"/>
               </a:rPr>
-              <a:t> </a:t>
+              <a:t> 	Achieved velocity: 6</a:t>
             </a:r>
             <a:r>
-              <a:rPr lang="en-US" sz="2000" dirty="0">
-                <a:solidFill>
-                  <a:schemeClr val="dk1"/>
-                </a:solidFill>
-                <a:latin typeface="Calibri"/>
-                <a:ea typeface="Calibri"/>
-                <a:cs typeface="Calibri"/>
-                <a:sym typeface="Calibri"/>
-              </a:rPr>
-              <a:t>	Achieved velocity: </a:t>
-            </a:r>
-            <a:r>
-              <a:rPr lang="en-US" sz="2000" dirty="0" smtClean="0">
-                <a:solidFill>
-                  <a:schemeClr val="dk1"/>
-                </a:solidFill>
-                <a:latin typeface="Calibri"/>
-                <a:ea typeface="Calibri"/>
-                <a:cs typeface="Calibri"/>
-                <a:sym typeface="Calibri"/>
-              </a:rPr>
-              <a:t>6</a:t>
-            </a:r>
-            <a:r>
-              <a:rPr lang="th-TH" sz="2000" dirty="0" smtClean="0">
+              <a:rPr lang="th-TH" sz="2000" dirty="0">
                 <a:solidFill>
                   <a:schemeClr val="dk1"/>
                 </a:solidFill>
@@ -20921,13 +21256,6 @@
   <p:transition spd="med">
     <p:fade/>
   </p:transition>
-  <p:timing>
-    <p:tnLst>
-      <p:par>
-        <p:cTn id="1" dur="indefinite" restart="never" nodeType="tmRoot"/>
-      </p:par>
-    </p:tnLst>
-  </p:timing>
 </p:sld>
 </file>
 
@@ -21116,13 +21444,6 @@
   <p:transition spd="med">
     <p:fade/>
   </p:transition>
-  <p:timing>
-    <p:tnLst>
-      <p:par>
-        <p:cTn id="1" dur="indefinite" restart="never" nodeType="tmRoot"/>
-      </p:par>
-    </p:tnLst>
-  </p:timing>
 </p:sld>
 </file>
 

</xml_diff>